<commit_message>
workshop and slides updated
</commit_message>
<xml_diff>
--- a/WDS/Whiteboard Design Session Trainer Presentation - Microservices architecture.pptx
+++ b/WDS/Whiteboard Design Session Trainer Presentation - Microservices architecture.pptx
@@ -225,7 +225,7 @@
           <a:p>
             <a:fld id="{52A13B17-C506-4D51-BB37-16B365906619}" type="datetimeFigureOut">
               <a:rPr lang="en-US" smtClean="0"/>
-              <a:t>5/3/2018</a:t>
+              <a:t>6/12/2018</a:t>
             </a:fld>
             <a:endParaRPr lang="en-US" dirty="0"/>
           </a:p>
@@ -3739,15 +3739,22 @@
           <a:bodyPr/>
           <a:lstStyle/>
           <a:p>
-            <a:pPr marL="0" indent="0">
-              <a:buFont typeface="Arial" panose="020B0604020202020204" pitchFamily="34" charset="0"/>
-              <a:buNone/>
-            </a:pPr>
             <a:r>
               <a:rPr lang="en-US" b="1" i="1" dirty="0"/>
-              <a:t>While we are interested in the microservices approach, we are still comparing Service Fabric with PaaS features such as App Services and SQL DB. Service Fabric seems relatively new, while App Services and SQL DB have been around for some time.</a:t>
-            </a:r>
-            <a:endParaRPr lang="en-US" b="0" i="0" dirty="0"/>
+              <a:t>While we are interested in the microservices approach, we are still comparing Service Fabric with PaaS features such as App Services and SQL DB. </a:t>
+            </a:r>
+            <a:r>
+              <a:rPr lang="en-US" sz="1200" b="1" i="1" kern="1200" dirty="0">
+                <a:solidFill>
+                  <a:schemeClr val="tx1"/>
+                </a:solidFill>
+                <a:effectLst/>
+                <a:latin typeface="+mn-lt"/>
+                <a:ea typeface="+mn-ea"/>
+                <a:cs typeface="+mn-cs"/>
+              </a:rPr>
+              <a:t>How mature is Service Fabric by comparison?</a:t>
+            </a:r>
           </a:p>
           <a:p>
             <a:pPr marL="171450" indent="-171450">
@@ -4246,7 +4253,7 @@
                   <a:prstClr val="black"/>
                 </a:solidFill>
               </a:rPr>
-              <a:t>5/3/2018 9:22 AM</a:t>
+              <a:t>6/12/2018 7:09 PM</a:t>
             </a:fld>
             <a:endParaRPr lang="en-US" dirty="0">
               <a:solidFill>

</xml_diff>